<commit_message>
Added a developing technology to push the mark up beyond 69% as per MEng requirements.
</commit_message>
<xml_diff>
--- a/Deliverables/2ndMarkerViva/viva_presentation.pptx
+++ b/Deliverables/2ndMarkerViva/viva_presentation.pptx
@@ -5,13 +5,14 @@
     <p:sldMasterId id="2147483648" r:id="rId1"/>
   </p:sldMasterIdLst>
   <p:notesMasterIdLst>
-    <p:notesMasterId r:id="rId6"/>
+    <p:notesMasterId r:id="rId7"/>
   </p:notesMasterIdLst>
   <p:sldIdLst>
     <p:sldId id="256" r:id="rId2"/>
     <p:sldId id="265" r:id="rId3"/>
     <p:sldId id="266" r:id="rId4"/>
     <p:sldId id="267" r:id="rId5"/>
+    <p:sldId id="268" r:id="rId6"/>
   </p:sldIdLst>
   <p:sldSz cx="12192000" cy="6858000"/>
   <p:notesSz cx="6858000" cy="9144000"/>
@@ -200,7 +201,7 @@
           <a:p>
             <a:fld id="{3642E725-44A3-439B-A511-F674A826BB22}" type="datetimeFigureOut">
               <a:rPr lang="en-GB" smtClean="0"/>
-              <a:t>10/02/2020</a:t>
+              <a:t>11/02/2020</a:t>
             </a:fld>
             <a:endParaRPr lang="en-GB"/>
           </a:p>
@@ -617,7 +618,7 @@
           <a:p>
             <a:fld id="{9B357CC7-4574-B54F-82B5-4084D5E86FC2}" type="datetimeFigureOut">
               <a:rPr lang="en-US" smtClean="0"/>
-              <a:t>2/10/20</a:t>
+              <a:t>2/11/2020</a:t>
             </a:fld>
             <a:endParaRPr lang="en-US"/>
           </a:p>
@@ -817,7 +818,7 @@
           <a:p>
             <a:fld id="{9B357CC7-4574-B54F-82B5-4084D5E86FC2}" type="datetimeFigureOut">
               <a:rPr lang="en-US" smtClean="0"/>
-              <a:t>2/10/20</a:t>
+              <a:t>2/11/2020</a:t>
             </a:fld>
             <a:endParaRPr lang="en-US"/>
           </a:p>
@@ -1027,7 +1028,7 @@
           <a:p>
             <a:fld id="{9B357CC7-4574-B54F-82B5-4084D5E86FC2}" type="datetimeFigureOut">
               <a:rPr lang="en-US" smtClean="0"/>
-              <a:t>2/10/20</a:t>
+              <a:t>2/11/2020</a:t>
             </a:fld>
             <a:endParaRPr lang="en-US"/>
           </a:p>
@@ -1227,7 +1228,7 @@
           <a:p>
             <a:fld id="{9B357CC7-4574-B54F-82B5-4084D5E86FC2}" type="datetimeFigureOut">
               <a:rPr lang="en-US" smtClean="0"/>
-              <a:t>2/10/20</a:t>
+              <a:t>2/11/2020</a:t>
             </a:fld>
             <a:endParaRPr lang="en-US"/>
           </a:p>
@@ -1503,7 +1504,7 @@
           <a:p>
             <a:fld id="{9B357CC7-4574-B54F-82B5-4084D5E86FC2}" type="datetimeFigureOut">
               <a:rPr lang="en-US" smtClean="0"/>
-              <a:t>2/10/20</a:t>
+              <a:t>2/11/2020</a:t>
             </a:fld>
             <a:endParaRPr lang="en-US"/>
           </a:p>
@@ -1771,7 +1772,7 @@
           <a:p>
             <a:fld id="{9B357CC7-4574-B54F-82B5-4084D5E86FC2}" type="datetimeFigureOut">
               <a:rPr lang="en-US" smtClean="0"/>
-              <a:t>2/10/20</a:t>
+              <a:t>2/11/2020</a:t>
             </a:fld>
             <a:endParaRPr lang="en-US"/>
           </a:p>
@@ -2186,7 +2187,7 @@
           <a:p>
             <a:fld id="{9B357CC7-4574-B54F-82B5-4084D5E86FC2}" type="datetimeFigureOut">
               <a:rPr lang="en-US" smtClean="0"/>
-              <a:t>2/10/20</a:t>
+              <a:t>2/11/2020</a:t>
             </a:fld>
             <a:endParaRPr lang="en-US"/>
           </a:p>
@@ -2328,7 +2329,7 @@
           <a:p>
             <a:fld id="{9B357CC7-4574-B54F-82B5-4084D5E86FC2}" type="datetimeFigureOut">
               <a:rPr lang="en-US" smtClean="0"/>
-              <a:t>2/10/20</a:t>
+              <a:t>2/11/2020</a:t>
             </a:fld>
             <a:endParaRPr lang="en-US"/>
           </a:p>
@@ -2441,7 +2442,7 @@
           <a:p>
             <a:fld id="{9B357CC7-4574-B54F-82B5-4084D5E86FC2}" type="datetimeFigureOut">
               <a:rPr lang="en-US" smtClean="0"/>
-              <a:t>2/10/20</a:t>
+              <a:t>2/11/2020</a:t>
             </a:fld>
             <a:endParaRPr lang="en-US"/>
           </a:p>
@@ -2754,7 +2755,7 @@
           <a:p>
             <a:fld id="{9B357CC7-4574-B54F-82B5-4084D5E86FC2}" type="datetimeFigureOut">
               <a:rPr lang="en-US" smtClean="0"/>
-              <a:t>2/10/20</a:t>
+              <a:t>2/11/2020</a:t>
             </a:fld>
             <a:endParaRPr lang="en-US"/>
           </a:p>
@@ -3043,7 +3044,7 @@
           <a:p>
             <a:fld id="{9B357CC7-4574-B54F-82B5-4084D5E86FC2}" type="datetimeFigureOut">
               <a:rPr lang="en-US" smtClean="0"/>
-              <a:t>2/10/20</a:t>
+              <a:t>2/11/2020</a:t>
             </a:fld>
             <a:endParaRPr lang="en-US"/>
           </a:p>
@@ -3286,7 +3287,7 @@
           <a:p>
             <a:fld id="{9B357CC7-4574-B54F-82B5-4084D5E86FC2}" type="datetimeFigureOut">
               <a:rPr lang="en-US" smtClean="0"/>
-              <a:t>2/10/20</a:t>
+              <a:t>2/11/2020</a:t>
             </a:fld>
             <a:endParaRPr lang="en-US"/>
           </a:p>
@@ -3890,7 +3891,7 @@
               <a:rPr lang="en-US" dirty="0">
                 <a:latin typeface="Garamond" panose="02020404030301010803" pitchFamily="18" charset="0"/>
               </a:rPr>
-              <a:t>Why are subwoofers such a problem</a:t>
+              <a:t>Loudspeakers are run open-loop… for no real reason</a:t>
             </a:r>
           </a:p>
           <a:p>
@@ -3898,7 +3899,7 @@
               <a:rPr lang="en-US" dirty="0">
                 <a:latin typeface="Garamond" panose="02020404030301010803" pitchFamily="18" charset="0"/>
               </a:rPr>
-              <a:t>What benefit is there to making them better</a:t>
+              <a:t>Subwoofers are the most non-linear of loudspeakers</a:t>
             </a:r>
           </a:p>
           <a:p>
@@ -3906,7 +3907,7 @@
               <a:rPr lang="en-US" dirty="0">
                 <a:latin typeface="Garamond" panose="02020404030301010803" pitchFamily="18" charset="0"/>
               </a:rPr>
-              <a:t>Why use electronic control techniques – why not just ‘build them better’?</a:t>
+              <a:t>Why not just ‘build them better’?</a:t>
             </a:r>
           </a:p>
           <a:p>
@@ -4179,6 +4180,113 @@
     <p:extLst>
       <p:ext uri="{BB962C8B-B14F-4D97-AF65-F5344CB8AC3E}">
         <p14:creationId xmlns:p14="http://schemas.microsoft.com/office/powerpoint/2010/main" val="1945806205"/>
+      </p:ext>
+    </p:extLst>
+  </p:cSld>
+  <p:clrMapOvr>
+    <a:masterClrMapping/>
+  </p:clrMapOvr>
+</p:sld>
+</file>
+
+<file path=ppt/slides/slide5.xml><?xml version="1.0" encoding="utf-8"?>
+<p:sld xmlns:a="http://schemas.openxmlformats.org/drawingml/2006/main" xmlns:r="http://schemas.openxmlformats.org/officeDocument/2006/relationships" xmlns:p="http://schemas.openxmlformats.org/presentationml/2006/main">
+  <p:cSld>
+    <p:spTree>
+      <p:nvGrpSpPr>
+        <p:cNvPr id="1" name=""/>
+        <p:cNvGrpSpPr/>
+        <p:nvPr/>
+      </p:nvGrpSpPr>
+      <p:grpSpPr>
+        <a:xfrm>
+          <a:off x="0" y="0"/>
+          <a:ext cx="0" cy="0"/>
+          <a:chOff x="0" y="0"/>
+          <a:chExt cx="0" cy="0"/>
+        </a:xfrm>
+      </p:grpSpPr>
+      <p:sp>
+        <p:nvSpPr>
+          <p:cNvPr id="2" name="Title 1">
+            <a:extLst>
+              <a:ext uri="{FF2B5EF4-FFF2-40B4-BE49-F238E27FC236}">
+                <a16:creationId xmlns:a16="http://schemas.microsoft.com/office/drawing/2014/main" id="{67BEF447-CE8A-4FDB-AD02-5B53F6852305}"/>
+              </a:ext>
+            </a:extLst>
+          </p:cNvPr>
+          <p:cNvSpPr>
+            <a:spLocks noGrp="1"/>
+          </p:cNvSpPr>
+          <p:nvPr>
+            <p:ph type="title"/>
+          </p:nvPr>
+        </p:nvSpPr>
+        <p:spPr/>
+        <p:txBody>
+          <a:bodyPr/>
+          <a:lstStyle/>
+          <a:p>
+            <a:r>
+              <a:rPr lang="en-GB" dirty="0">
+                <a:latin typeface="Garamond" panose="02020404030301010803" pitchFamily="18" charset="0"/>
+              </a:rPr>
+              <a:t>Developing Technologies</a:t>
+            </a:r>
+          </a:p>
+        </p:txBody>
+      </p:sp>
+      <p:sp>
+        <p:nvSpPr>
+          <p:cNvPr id="3" name="Content Placeholder 2">
+            <a:extLst>
+              <a:ext uri="{FF2B5EF4-FFF2-40B4-BE49-F238E27FC236}">
+                <a16:creationId xmlns:a16="http://schemas.microsoft.com/office/drawing/2014/main" id="{4AC14423-7CC2-4F75-89D8-928F56D3C4F2}"/>
+              </a:ext>
+            </a:extLst>
+          </p:cNvPr>
+          <p:cNvSpPr>
+            <a:spLocks noGrp="1"/>
+          </p:cNvSpPr>
+          <p:nvPr>
+            <p:ph idx="1"/>
+          </p:nvPr>
+        </p:nvSpPr>
+        <p:spPr/>
+        <p:txBody>
+          <a:bodyPr/>
+          <a:lstStyle/>
+          <a:p>
+            <a:r>
+              <a:rPr lang="en-GB" dirty="0">
+                <a:latin typeface="Garamond" panose="02020404030301010803" pitchFamily="18" charset="0"/>
+              </a:rPr>
+              <a:t>A novel method of designing and implementing all required open- and closed-loop circuitry could be by using a field-programmable analogue array, such as those designed by </a:t>
+            </a:r>
+            <a:r>
+              <a:rPr lang="en-GB" dirty="0" err="1">
+                <a:latin typeface="Garamond" panose="02020404030301010803" pitchFamily="18" charset="0"/>
+              </a:rPr>
+              <a:t>Anadigm</a:t>
+            </a:r>
+            <a:r>
+              <a:rPr lang="en-GB" dirty="0">
+                <a:latin typeface="Garamond" panose="02020404030301010803" pitchFamily="18" charset="0"/>
+              </a:rPr>
+              <a:t>. Limits physical size and complexity of solutions, allows for patches from manufacturers to users, could even make a GUI to allow users to tune their own devices (although probably not possible because you need to program them through MATLAB)</a:t>
+            </a:r>
+          </a:p>
+          <a:p>
+            <a:endParaRPr lang="en-GB" dirty="0">
+              <a:latin typeface="Garamond" panose="02020404030301010803" pitchFamily="18" charset="0"/>
+            </a:endParaRPr>
+          </a:p>
+        </p:txBody>
+      </p:sp>
+    </p:spTree>
+    <p:extLst>
+      <p:ext uri="{BB962C8B-B14F-4D97-AF65-F5344CB8AC3E}">
+        <p14:creationId xmlns:p14="http://schemas.microsoft.com/office/powerpoint/2010/main" val="4046729375"/>
       </p:ext>
     </p:extLst>
   </p:cSld>

</xml_diff>

<commit_message>
Developing viva presentation with script.
</commit_message>
<xml_diff>
--- a/Deliverables/2ndMarkerViva/viva_presentation.pptx
+++ b/Deliverables/2ndMarkerViva/viva_presentation.pptx
@@ -5,7 +5,7 @@
     <p:sldMasterId id="2147483648" r:id="rId1"/>
   </p:sldMasterIdLst>
   <p:notesMasterIdLst>
-    <p:notesMasterId r:id="rId7"/>
+    <p:notesMasterId r:id="rId12"/>
   </p:notesMasterIdLst>
   <p:sldIdLst>
     <p:sldId id="256" r:id="rId2"/>
@@ -13,6 +13,11 @@
     <p:sldId id="266" r:id="rId4"/>
     <p:sldId id="267" r:id="rId5"/>
     <p:sldId id="268" r:id="rId6"/>
+    <p:sldId id="269" r:id="rId7"/>
+    <p:sldId id="270" r:id="rId8"/>
+    <p:sldId id="271" r:id="rId9"/>
+    <p:sldId id="272" r:id="rId10"/>
+    <p:sldId id="273" r:id="rId11"/>
   </p:sldIdLst>
   <p:sldSz cx="12192000" cy="6858000"/>
   <p:notesSz cx="6858000" cy="9144000"/>
@@ -201,7 +206,7 @@
           <a:p>
             <a:fld id="{3642E725-44A3-439B-A511-F674A826BB22}" type="datetimeFigureOut">
               <a:rPr lang="en-GB" smtClean="0"/>
-              <a:t>11/02/2020</a:t>
+              <a:t>12/02/2020</a:t>
             </a:fld>
             <a:endParaRPr lang="en-GB"/>
           </a:p>
@@ -618,7 +623,7 @@
           <a:p>
             <a:fld id="{9B357CC7-4574-B54F-82B5-4084D5E86FC2}" type="datetimeFigureOut">
               <a:rPr lang="en-US" smtClean="0"/>
-              <a:t>2/11/2020</a:t>
+              <a:t>2/12/20</a:t>
             </a:fld>
             <a:endParaRPr lang="en-US"/>
           </a:p>
@@ -818,7 +823,7 @@
           <a:p>
             <a:fld id="{9B357CC7-4574-B54F-82B5-4084D5E86FC2}" type="datetimeFigureOut">
               <a:rPr lang="en-US" smtClean="0"/>
-              <a:t>2/11/2020</a:t>
+              <a:t>2/12/20</a:t>
             </a:fld>
             <a:endParaRPr lang="en-US"/>
           </a:p>
@@ -1028,7 +1033,7 @@
           <a:p>
             <a:fld id="{9B357CC7-4574-B54F-82B5-4084D5E86FC2}" type="datetimeFigureOut">
               <a:rPr lang="en-US" smtClean="0"/>
-              <a:t>2/11/2020</a:t>
+              <a:t>2/12/20</a:t>
             </a:fld>
             <a:endParaRPr lang="en-US"/>
           </a:p>
@@ -1228,7 +1233,7 @@
           <a:p>
             <a:fld id="{9B357CC7-4574-B54F-82B5-4084D5E86FC2}" type="datetimeFigureOut">
               <a:rPr lang="en-US" smtClean="0"/>
-              <a:t>2/11/2020</a:t>
+              <a:t>2/12/20</a:t>
             </a:fld>
             <a:endParaRPr lang="en-US"/>
           </a:p>
@@ -1504,7 +1509,7 @@
           <a:p>
             <a:fld id="{9B357CC7-4574-B54F-82B5-4084D5E86FC2}" type="datetimeFigureOut">
               <a:rPr lang="en-US" smtClean="0"/>
-              <a:t>2/11/2020</a:t>
+              <a:t>2/12/20</a:t>
             </a:fld>
             <a:endParaRPr lang="en-US"/>
           </a:p>
@@ -1772,7 +1777,7 @@
           <a:p>
             <a:fld id="{9B357CC7-4574-B54F-82B5-4084D5E86FC2}" type="datetimeFigureOut">
               <a:rPr lang="en-US" smtClean="0"/>
-              <a:t>2/11/2020</a:t>
+              <a:t>2/12/20</a:t>
             </a:fld>
             <a:endParaRPr lang="en-US"/>
           </a:p>
@@ -2187,7 +2192,7 @@
           <a:p>
             <a:fld id="{9B357CC7-4574-B54F-82B5-4084D5E86FC2}" type="datetimeFigureOut">
               <a:rPr lang="en-US" smtClean="0"/>
-              <a:t>2/11/2020</a:t>
+              <a:t>2/12/20</a:t>
             </a:fld>
             <a:endParaRPr lang="en-US"/>
           </a:p>
@@ -2329,7 +2334,7 @@
           <a:p>
             <a:fld id="{9B357CC7-4574-B54F-82B5-4084D5E86FC2}" type="datetimeFigureOut">
               <a:rPr lang="en-US" smtClean="0"/>
-              <a:t>2/11/2020</a:t>
+              <a:t>2/12/20</a:t>
             </a:fld>
             <a:endParaRPr lang="en-US"/>
           </a:p>
@@ -2442,7 +2447,7 @@
           <a:p>
             <a:fld id="{9B357CC7-4574-B54F-82B5-4084D5E86FC2}" type="datetimeFigureOut">
               <a:rPr lang="en-US" smtClean="0"/>
-              <a:t>2/11/2020</a:t>
+              <a:t>2/12/20</a:t>
             </a:fld>
             <a:endParaRPr lang="en-US"/>
           </a:p>
@@ -2755,7 +2760,7 @@
           <a:p>
             <a:fld id="{9B357CC7-4574-B54F-82B5-4084D5E86FC2}" type="datetimeFigureOut">
               <a:rPr lang="en-US" smtClean="0"/>
-              <a:t>2/11/2020</a:t>
+              <a:t>2/12/20</a:t>
             </a:fld>
             <a:endParaRPr lang="en-US"/>
           </a:p>
@@ -3044,7 +3049,7 @@
           <a:p>
             <a:fld id="{9B357CC7-4574-B54F-82B5-4084D5E86FC2}" type="datetimeFigureOut">
               <a:rPr lang="en-US" smtClean="0"/>
-              <a:t>2/11/2020</a:t>
+              <a:t>2/12/20</a:t>
             </a:fld>
             <a:endParaRPr lang="en-US"/>
           </a:p>
@@ -3287,7 +3292,7 @@
           <a:p>
             <a:fld id="{9B357CC7-4574-B54F-82B5-4084D5E86FC2}" type="datetimeFigureOut">
               <a:rPr lang="en-US" smtClean="0"/>
-              <a:t>2/11/2020</a:t>
+              <a:t>2/12/20</a:t>
             </a:fld>
             <a:endParaRPr lang="en-US"/>
           </a:p>
@@ -3819,6 +3824,95 @@
 </p:sld>
 </file>
 
+<file path=ppt/slides/slide10.xml><?xml version="1.0" encoding="utf-8"?>
+<p:sld xmlns:a="http://schemas.openxmlformats.org/drawingml/2006/main" xmlns:r="http://schemas.openxmlformats.org/officeDocument/2006/relationships" xmlns:p="http://schemas.openxmlformats.org/presentationml/2006/main">
+  <p:cSld>
+    <p:spTree>
+      <p:nvGrpSpPr>
+        <p:cNvPr id="1" name=""/>
+        <p:cNvGrpSpPr/>
+        <p:nvPr/>
+      </p:nvGrpSpPr>
+      <p:grpSpPr>
+        <a:xfrm>
+          <a:off x="0" y="0"/>
+          <a:ext cx="0" cy="0"/>
+          <a:chOff x="0" y="0"/>
+          <a:chExt cx="0" cy="0"/>
+        </a:xfrm>
+      </p:grpSpPr>
+      <p:sp>
+        <p:nvSpPr>
+          <p:cNvPr id="2" name="Title 1">
+            <a:extLst>
+              <a:ext uri="{FF2B5EF4-FFF2-40B4-BE49-F238E27FC236}">
+                <a16:creationId xmlns:a16="http://schemas.microsoft.com/office/drawing/2014/main" id="{80017211-A5EB-D54C-9384-2003199938E6}"/>
+              </a:ext>
+            </a:extLst>
+          </p:cNvPr>
+          <p:cNvSpPr>
+            <a:spLocks noGrp="1"/>
+          </p:cNvSpPr>
+          <p:nvPr>
+            <p:ph type="title"/>
+          </p:nvPr>
+        </p:nvSpPr>
+        <p:spPr/>
+        <p:txBody>
+          <a:bodyPr/>
+          <a:lstStyle/>
+          <a:p>
+            <a:r>
+              <a:rPr lang="en-US" dirty="0"/>
+              <a:t>Enclosure design</a:t>
+            </a:r>
+          </a:p>
+        </p:txBody>
+      </p:sp>
+      <p:sp>
+        <p:nvSpPr>
+          <p:cNvPr id="3" name="Content Placeholder 2">
+            <a:extLst>
+              <a:ext uri="{FF2B5EF4-FFF2-40B4-BE49-F238E27FC236}">
+                <a16:creationId xmlns:a16="http://schemas.microsoft.com/office/drawing/2014/main" id="{6CB082B5-81C1-AB46-A144-30DCE1B2DB0A}"/>
+              </a:ext>
+            </a:extLst>
+          </p:cNvPr>
+          <p:cNvSpPr>
+            <a:spLocks noGrp="1"/>
+          </p:cNvSpPr>
+          <p:nvPr>
+            <p:ph idx="1"/>
+          </p:nvPr>
+        </p:nvSpPr>
+        <p:spPr/>
+        <p:txBody>
+          <a:bodyPr/>
+          <a:lstStyle/>
+          <a:p>
+            <a:r>
+              <a:rPr lang="en-US" dirty="0"/>
+              <a:t>Requires Thiele-Small parameters</a:t>
+            </a:r>
+          </a:p>
+          <a:p>
+            <a:endParaRPr lang="en-US" dirty="0"/>
+          </a:p>
+        </p:txBody>
+      </p:sp>
+    </p:spTree>
+    <p:extLst>
+      <p:ext uri="{BB962C8B-B14F-4D97-AF65-F5344CB8AC3E}">
+        <p14:creationId xmlns:p14="http://schemas.microsoft.com/office/powerpoint/2010/main" val="1437276838"/>
+      </p:ext>
+    </p:extLst>
+  </p:cSld>
+  <p:clrMapOvr>
+    <a:masterClrMapping/>
+  </p:clrMapOvr>
+</p:sld>
+</file>
+
 <file path=ppt/slides/slide2.xml><?xml version="1.0" encoding="utf-8"?>
 <p:sld xmlns:a="http://schemas.openxmlformats.org/drawingml/2006/main" xmlns:r="http://schemas.openxmlformats.org/officeDocument/2006/relationships" xmlns:p="http://schemas.openxmlformats.org/presentationml/2006/main">
   <p:cSld>
@@ -4287,6 +4381,407 @@
     <p:extLst>
       <p:ext uri="{BB962C8B-B14F-4D97-AF65-F5344CB8AC3E}">
         <p14:creationId xmlns:p14="http://schemas.microsoft.com/office/powerpoint/2010/main" val="4046729375"/>
+      </p:ext>
+    </p:extLst>
+  </p:cSld>
+  <p:clrMapOvr>
+    <a:masterClrMapping/>
+  </p:clrMapOvr>
+</p:sld>
+</file>
+
+<file path=ppt/slides/slide6.xml><?xml version="1.0" encoding="utf-8"?>
+<p:sld xmlns:a="http://schemas.openxmlformats.org/drawingml/2006/main" xmlns:r="http://schemas.openxmlformats.org/officeDocument/2006/relationships" xmlns:p="http://schemas.openxmlformats.org/presentationml/2006/main">
+  <p:cSld>
+    <p:spTree>
+      <p:nvGrpSpPr>
+        <p:cNvPr id="1" name=""/>
+        <p:cNvGrpSpPr/>
+        <p:nvPr/>
+      </p:nvGrpSpPr>
+      <p:grpSpPr>
+        <a:xfrm>
+          <a:off x="0" y="0"/>
+          <a:ext cx="0" cy="0"/>
+          <a:chOff x="0" y="0"/>
+          <a:chExt cx="0" cy="0"/>
+        </a:xfrm>
+      </p:grpSpPr>
+      <p:sp>
+        <p:nvSpPr>
+          <p:cNvPr id="2" name="Title 1">
+            <a:extLst>
+              <a:ext uri="{FF2B5EF4-FFF2-40B4-BE49-F238E27FC236}">
+                <a16:creationId xmlns:a16="http://schemas.microsoft.com/office/drawing/2014/main" id="{AAFD3B8C-D360-404D-AA4C-E1600784809F}"/>
+              </a:ext>
+            </a:extLst>
+          </p:cNvPr>
+          <p:cNvSpPr>
+            <a:spLocks noGrp="1"/>
+          </p:cNvSpPr>
+          <p:nvPr>
+            <p:ph type="title"/>
+          </p:nvPr>
+        </p:nvSpPr>
+        <p:spPr/>
+        <p:txBody>
+          <a:bodyPr/>
+          <a:lstStyle/>
+          <a:p>
+            <a:r>
+              <a:rPr lang="en-US" dirty="0"/>
+              <a:t>The Problem with Loudspeakers</a:t>
+            </a:r>
+          </a:p>
+        </p:txBody>
+      </p:sp>
+      <p:sp>
+        <p:nvSpPr>
+          <p:cNvPr id="3" name="Content Placeholder 2">
+            <a:extLst>
+              <a:ext uri="{FF2B5EF4-FFF2-40B4-BE49-F238E27FC236}">
+                <a16:creationId xmlns:a16="http://schemas.microsoft.com/office/drawing/2014/main" id="{048B8A3E-99C1-A542-B10D-F957C76D4652}"/>
+              </a:ext>
+            </a:extLst>
+          </p:cNvPr>
+          <p:cNvSpPr>
+            <a:spLocks noGrp="1"/>
+          </p:cNvSpPr>
+          <p:nvPr>
+            <p:ph idx="1"/>
+          </p:nvPr>
+        </p:nvSpPr>
+        <p:spPr/>
+        <p:txBody>
+          <a:bodyPr/>
+          <a:lstStyle/>
+          <a:p>
+            <a:r>
+              <a:rPr lang="en-US" dirty="0"/>
+              <a:t>Non-linear</a:t>
+            </a:r>
+          </a:p>
+          <a:p>
+            <a:r>
+              <a:rPr lang="en-US" dirty="0"/>
+              <a:t>Not normally controlled</a:t>
+            </a:r>
+          </a:p>
+          <a:p>
+            <a:r>
+              <a:rPr lang="en-US" dirty="0"/>
+              <a:t>As a result are expensive – average quality of sound reproduction lower than it could be</a:t>
+            </a:r>
+          </a:p>
+        </p:txBody>
+      </p:sp>
+    </p:spTree>
+    <p:extLst>
+      <p:ext uri="{BB962C8B-B14F-4D97-AF65-F5344CB8AC3E}">
+        <p14:creationId xmlns:p14="http://schemas.microsoft.com/office/powerpoint/2010/main" val="825884960"/>
+      </p:ext>
+    </p:extLst>
+  </p:cSld>
+  <p:clrMapOvr>
+    <a:masterClrMapping/>
+  </p:clrMapOvr>
+</p:sld>
+</file>
+
+<file path=ppt/slides/slide7.xml><?xml version="1.0" encoding="utf-8"?>
+<p:sld xmlns:a="http://schemas.openxmlformats.org/drawingml/2006/main" xmlns:r="http://schemas.openxmlformats.org/officeDocument/2006/relationships" xmlns:p="http://schemas.openxmlformats.org/presentationml/2006/main">
+  <p:cSld>
+    <p:spTree>
+      <p:nvGrpSpPr>
+        <p:cNvPr id="1" name=""/>
+        <p:cNvGrpSpPr/>
+        <p:nvPr/>
+      </p:nvGrpSpPr>
+      <p:grpSpPr>
+        <a:xfrm>
+          <a:off x="0" y="0"/>
+          <a:ext cx="0" cy="0"/>
+          <a:chOff x="0" y="0"/>
+          <a:chExt cx="0" cy="0"/>
+        </a:xfrm>
+      </p:grpSpPr>
+      <p:sp>
+        <p:nvSpPr>
+          <p:cNvPr id="2" name="Title 1">
+            <a:extLst>
+              <a:ext uri="{FF2B5EF4-FFF2-40B4-BE49-F238E27FC236}">
+                <a16:creationId xmlns:a16="http://schemas.microsoft.com/office/drawing/2014/main" id="{B44F82D9-6C99-9146-AAF5-B96122560FD0}"/>
+              </a:ext>
+            </a:extLst>
+          </p:cNvPr>
+          <p:cNvSpPr>
+            <a:spLocks noGrp="1"/>
+          </p:cNvSpPr>
+          <p:nvPr>
+            <p:ph type="title"/>
+          </p:nvPr>
+        </p:nvSpPr>
+        <p:spPr/>
+        <p:txBody>
+          <a:bodyPr/>
+          <a:lstStyle/>
+          <a:p>
+            <a:r>
+              <a:rPr lang="en-US" dirty="0"/>
+              <a:t>The solution</a:t>
+            </a:r>
+          </a:p>
+        </p:txBody>
+      </p:sp>
+      <p:sp>
+        <p:nvSpPr>
+          <p:cNvPr id="3" name="Content Placeholder 2">
+            <a:extLst>
+              <a:ext uri="{FF2B5EF4-FFF2-40B4-BE49-F238E27FC236}">
+                <a16:creationId xmlns:a16="http://schemas.microsoft.com/office/drawing/2014/main" id="{CDE426D1-7D3C-BA42-B04B-7A0E7046D100}"/>
+              </a:ext>
+            </a:extLst>
+          </p:cNvPr>
+          <p:cNvSpPr>
+            <a:spLocks noGrp="1"/>
+          </p:cNvSpPr>
+          <p:nvPr>
+            <p:ph idx="1"/>
+          </p:nvPr>
+        </p:nvSpPr>
+        <p:spPr/>
+        <p:txBody>
+          <a:bodyPr/>
+          <a:lstStyle/>
+          <a:p>
+            <a:r>
+              <a:rPr lang="en-US" dirty="0"/>
+              <a:t>Open- and closed-loop compensators</a:t>
+            </a:r>
+          </a:p>
+          <a:p>
+            <a:r>
+              <a:rPr lang="en-US" dirty="0"/>
+              <a:t>Electronic solution is cheap, easy to manufacture and install</a:t>
+            </a:r>
+          </a:p>
+          <a:p>
+            <a:r>
+              <a:rPr lang="en-US" dirty="0"/>
+              <a:t>Fewer distortions, fewer non-linearities = cleaner sound reproductions</a:t>
+            </a:r>
+          </a:p>
+          <a:p>
+            <a:r>
+              <a:rPr lang="en-US" dirty="0"/>
+              <a:t>Unique to subwoofers = extension of bass response </a:t>
+            </a:r>
+          </a:p>
+          <a:p>
+            <a:endParaRPr lang="en-US" dirty="0"/>
+          </a:p>
+        </p:txBody>
+      </p:sp>
+    </p:spTree>
+    <p:extLst>
+      <p:ext uri="{BB962C8B-B14F-4D97-AF65-F5344CB8AC3E}">
+        <p14:creationId xmlns:p14="http://schemas.microsoft.com/office/powerpoint/2010/main" val="540741382"/>
+      </p:ext>
+    </p:extLst>
+  </p:cSld>
+  <p:clrMapOvr>
+    <a:masterClrMapping/>
+  </p:clrMapOvr>
+</p:sld>
+</file>
+
+<file path=ppt/slides/slide8.xml><?xml version="1.0" encoding="utf-8"?>
+<p:sld xmlns:a="http://schemas.openxmlformats.org/drawingml/2006/main" xmlns:r="http://schemas.openxmlformats.org/officeDocument/2006/relationships" xmlns:p="http://schemas.openxmlformats.org/presentationml/2006/main">
+  <p:cSld>
+    <p:spTree>
+      <p:nvGrpSpPr>
+        <p:cNvPr id="1" name=""/>
+        <p:cNvGrpSpPr/>
+        <p:nvPr/>
+      </p:nvGrpSpPr>
+      <p:grpSpPr>
+        <a:xfrm>
+          <a:off x="0" y="0"/>
+          <a:ext cx="0" cy="0"/>
+          <a:chOff x="0" y="0"/>
+          <a:chExt cx="0" cy="0"/>
+        </a:xfrm>
+      </p:grpSpPr>
+      <p:sp>
+        <p:nvSpPr>
+          <p:cNvPr id="2" name="Title 1">
+            <a:extLst>
+              <a:ext uri="{FF2B5EF4-FFF2-40B4-BE49-F238E27FC236}">
+                <a16:creationId xmlns:a16="http://schemas.microsoft.com/office/drawing/2014/main" id="{F19D0235-F752-DD41-9EB0-208CE4AA3423}"/>
+              </a:ext>
+            </a:extLst>
+          </p:cNvPr>
+          <p:cNvSpPr>
+            <a:spLocks noGrp="1"/>
+          </p:cNvSpPr>
+          <p:nvPr>
+            <p:ph type="title"/>
+          </p:nvPr>
+        </p:nvSpPr>
+        <p:spPr/>
+        <p:txBody>
+          <a:bodyPr/>
+          <a:lstStyle/>
+          <a:p>
+            <a:r>
+              <a:rPr lang="en-US" dirty="0"/>
+              <a:t>The process</a:t>
+            </a:r>
+          </a:p>
+        </p:txBody>
+      </p:sp>
+      <p:sp>
+        <p:nvSpPr>
+          <p:cNvPr id="3" name="Content Placeholder 2">
+            <a:extLst>
+              <a:ext uri="{FF2B5EF4-FFF2-40B4-BE49-F238E27FC236}">
+                <a16:creationId xmlns:a16="http://schemas.microsoft.com/office/drawing/2014/main" id="{4786A98A-A82E-2545-90B3-D0CE64E74881}"/>
+              </a:ext>
+            </a:extLst>
+          </p:cNvPr>
+          <p:cNvSpPr>
+            <a:spLocks noGrp="1"/>
+          </p:cNvSpPr>
+          <p:nvPr>
+            <p:ph idx="1"/>
+          </p:nvPr>
+        </p:nvSpPr>
+        <p:spPr/>
+        <p:txBody>
+          <a:bodyPr/>
+          <a:lstStyle/>
+          <a:p>
+            <a:r>
+              <a:rPr lang="en-US" dirty="0"/>
+              <a:t>Choose a subwoofer</a:t>
+            </a:r>
+          </a:p>
+          <a:p>
+            <a:r>
+              <a:rPr lang="en-US" dirty="0"/>
+              <a:t>Make an enclosure for the subwoofer</a:t>
+            </a:r>
+          </a:p>
+          <a:p>
+            <a:r>
+              <a:rPr lang="en-US" dirty="0"/>
+              <a:t>Design an open-loop compensator</a:t>
+            </a:r>
+          </a:p>
+          <a:p>
+            <a:r>
+              <a:rPr lang="en-US" dirty="0"/>
+              <a:t>Design a closed-loop compensator</a:t>
+            </a:r>
+          </a:p>
+          <a:p>
+            <a:r>
+              <a:rPr lang="en-US" dirty="0"/>
+              <a:t>Testing and tuning</a:t>
+            </a:r>
+          </a:p>
+        </p:txBody>
+      </p:sp>
+    </p:spTree>
+    <p:extLst>
+      <p:ext uri="{BB962C8B-B14F-4D97-AF65-F5344CB8AC3E}">
+        <p14:creationId xmlns:p14="http://schemas.microsoft.com/office/powerpoint/2010/main" val="3327246641"/>
+      </p:ext>
+    </p:extLst>
+  </p:cSld>
+  <p:clrMapOvr>
+    <a:masterClrMapping/>
+  </p:clrMapOvr>
+</p:sld>
+</file>
+
+<file path=ppt/slides/slide9.xml><?xml version="1.0" encoding="utf-8"?>
+<p:sld xmlns:a="http://schemas.openxmlformats.org/drawingml/2006/main" xmlns:r="http://schemas.openxmlformats.org/officeDocument/2006/relationships" xmlns:p="http://schemas.openxmlformats.org/presentationml/2006/main">
+  <p:cSld>
+    <p:spTree>
+      <p:nvGrpSpPr>
+        <p:cNvPr id="1" name=""/>
+        <p:cNvGrpSpPr/>
+        <p:nvPr/>
+      </p:nvGrpSpPr>
+      <p:grpSpPr>
+        <a:xfrm>
+          <a:off x="0" y="0"/>
+          <a:ext cx="0" cy="0"/>
+          <a:chOff x="0" y="0"/>
+          <a:chExt cx="0" cy="0"/>
+        </a:xfrm>
+      </p:grpSpPr>
+      <p:sp>
+        <p:nvSpPr>
+          <p:cNvPr id="2" name="Title 1">
+            <a:extLst>
+              <a:ext uri="{FF2B5EF4-FFF2-40B4-BE49-F238E27FC236}">
+                <a16:creationId xmlns:a16="http://schemas.microsoft.com/office/drawing/2014/main" id="{E8C9ACE8-E288-FE46-B2D9-66658D1C715D}"/>
+              </a:ext>
+            </a:extLst>
+          </p:cNvPr>
+          <p:cNvSpPr>
+            <a:spLocks noGrp="1"/>
+          </p:cNvSpPr>
+          <p:nvPr>
+            <p:ph type="title"/>
+          </p:nvPr>
+        </p:nvSpPr>
+        <p:spPr/>
+        <p:txBody>
+          <a:bodyPr/>
+          <a:lstStyle/>
+          <a:p>
+            <a:r>
+              <a:rPr lang="en-US" dirty="0"/>
+              <a:t>Choosing a subwoofer</a:t>
+            </a:r>
+          </a:p>
+        </p:txBody>
+      </p:sp>
+      <p:sp>
+        <p:nvSpPr>
+          <p:cNvPr id="3" name="Content Placeholder 2">
+            <a:extLst>
+              <a:ext uri="{FF2B5EF4-FFF2-40B4-BE49-F238E27FC236}">
+                <a16:creationId xmlns:a16="http://schemas.microsoft.com/office/drawing/2014/main" id="{D55B1E5C-E32E-214E-A7B6-E4A1438CA9A1}"/>
+              </a:ext>
+            </a:extLst>
+          </p:cNvPr>
+          <p:cNvSpPr>
+            <a:spLocks noGrp="1"/>
+          </p:cNvSpPr>
+          <p:nvPr>
+            <p:ph idx="1"/>
+          </p:nvPr>
+        </p:nvSpPr>
+        <p:spPr/>
+        <p:txBody>
+          <a:bodyPr/>
+          <a:lstStyle/>
+          <a:p>
+            <a:r>
+              <a:rPr lang="en-US" dirty="0"/>
+              <a:t>Choose a cheap model to prove that good quality sound can be achieved cheaply, in comparison to really expensive high-quality systems.</a:t>
+            </a:r>
+          </a:p>
+        </p:txBody>
+      </p:sp>
+    </p:spTree>
+    <p:extLst>
+      <p:ext uri="{BB962C8B-B14F-4D97-AF65-F5344CB8AC3E}">
+        <p14:creationId xmlns:p14="http://schemas.microsoft.com/office/powerpoint/2010/main" val="436913128"/>
       </p:ext>
     </p:extLst>
   </p:cSld>

</xml_diff>

<commit_message>
Working on viva presentation.
</commit_message>
<xml_diff>
--- a/Deliverables/2ndMarkerViva/viva_presentation.pptx
+++ b/Deliverables/2ndMarkerViva/viva_presentation.pptx
@@ -5,7 +5,7 @@
     <p:sldMasterId id="2147483648" r:id="rId1"/>
   </p:sldMasterIdLst>
   <p:notesMasterIdLst>
-    <p:notesMasterId r:id="rId13"/>
+    <p:notesMasterId r:id="rId16"/>
   </p:notesMasterIdLst>
   <p:sldIdLst>
     <p:sldId id="256" r:id="rId2"/>
@@ -19,6 +19,9 @@
     <p:sldId id="271" r:id="rId10"/>
     <p:sldId id="272" r:id="rId11"/>
     <p:sldId id="273" r:id="rId12"/>
+    <p:sldId id="275" r:id="rId13"/>
+    <p:sldId id="276" r:id="rId14"/>
+    <p:sldId id="277" r:id="rId15"/>
   </p:sldIdLst>
   <p:sldSz cx="12192000" cy="6858000"/>
   <p:notesSz cx="6858000" cy="9144000"/>
@@ -3896,6 +3899,12 @@
               <a:t>Choose a cheap model to prove that good quality sound can be achieved cheaply, in comparison to really expensive high-quality systems.</a:t>
             </a:r>
           </a:p>
+          <a:p>
+            <a:r>
+              <a:rPr lang="en-US" dirty="0"/>
+              <a:t>Pyle PLPW6D was cheap and easy to acquire, features two voice coils – potential for sensing/driving setup</a:t>
+            </a:r>
+          </a:p>
         </p:txBody>
       </p:sp>
     </p:spTree>
@@ -3983,6 +3992,40 @@
             </a:r>
           </a:p>
           <a:p>
+            <a:r>
+              <a:rPr lang="en-US" dirty="0"/>
+              <a:t>[</a:t>
+            </a:r>
+            <a:r>
+              <a:rPr lang="en-US" dirty="0" err="1"/>
+              <a:t>Maths</a:t>
+            </a:r>
+            <a:r>
+              <a:rPr lang="en-US" dirty="0"/>
+              <a:t>]</a:t>
+            </a:r>
+          </a:p>
+          <a:p>
+            <a:r>
+              <a:rPr lang="en-US" dirty="0"/>
+              <a:t>Basically you’re </a:t>
+            </a:r>
+            <a:r>
+              <a:rPr lang="en-GB" dirty="0"/>
+              <a:t>optimising</a:t>
+            </a:r>
+            <a:r>
+              <a:rPr lang="en-US" dirty="0"/>
+              <a:t> to try and make sure that there’s enough air behind the subwoofer to ensure that the air doesn’t firm up the action of the subwoofer too much, but also not too much air so that there’s still a bit of spring which keeps the action nice and tight</a:t>
+            </a:r>
+          </a:p>
+          <a:p>
+            <a:r>
+              <a:rPr lang="en-US" dirty="0"/>
+              <a:t>It transpires that you’re designing a box based on a new peak resonant mechanical frequency – makes designing a box for any driver pretty straightforward</a:t>
+            </a:r>
+          </a:p>
+          <a:p>
             <a:endParaRPr lang="en-US" dirty="0"/>
           </a:p>
         </p:txBody>
@@ -3991,6 +4034,287 @@
     <p:extLst>
       <p:ext uri="{BB962C8B-B14F-4D97-AF65-F5344CB8AC3E}">
         <p14:creationId xmlns:p14="http://schemas.microsoft.com/office/powerpoint/2010/main" val="1437276838"/>
+      </p:ext>
+    </p:extLst>
+  </p:cSld>
+  <p:clrMapOvr>
+    <a:masterClrMapping/>
+  </p:clrMapOvr>
+</p:sld>
+</file>
+
+<file path=ppt/slides/slide12.xml><?xml version="1.0" encoding="utf-8"?>
+<p:sld xmlns:a="http://schemas.openxmlformats.org/drawingml/2006/main" xmlns:r="http://schemas.openxmlformats.org/officeDocument/2006/relationships" xmlns:p="http://schemas.openxmlformats.org/presentationml/2006/main">
+  <p:cSld>
+    <p:spTree>
+      <p:nvGrpSpPr>
+        <p:cNvPr id="1" name=""/>
+        <p:cNvGrpSpPr/>
+        <p:nvPr/>
+      </p:nvGrpSpPr>
+      <p:grpSpPr>
+        <a:xfrm>
+          <a:off x="0" y="0"/>
+          <a:ext cx="0" cy="0"/>
+          <a:chOff x="0" y="0"/>
+          <a:chExt cx="0" cy="0"/>
+        </a:xfrm>
+      </p:grpSpPr>
+      <p:sp>
+        <p:nvSpPr>
+          <p:cNvPr id="2" name="Title 1">
+            <a:extLst>
+              <a:ext uri="{FF2B5EF4-FFF2-40B4-BE49-F238E27FC236}">
+                <a16:creationId xmlns:a16="http://schemas.microsoft.com/office/drawing/2014/main" id="{80A052AB-A233-8E48-B434-13470559098B}"/>
+              </a:ext>
+            </a:extLst>
+          </p:cNvPr>
+          <p:cNvSpPr>
+            <a:spLocks noGrp="1"/>
+          </p:cNvSpPr>
+          <p:nvPr>
+            <p:ph type="title"/>
+          </p:nvPr>
+        </p:nvSpPr>
+        <p:spPr/>
+        <p:txBody>
+          <a:bodyPr/>
+          <a:lstStyle/>
+          <a:p>
+            <a:r>
+              <a:rPr lang="en-US" dirty="0"/>
+              <a:t>Open-loop circuit design</a:t>
+            </a:r>
+          </a:p>
+        </p:txBody>
+      </p:sp>
+      <p:sp>
+        <p:nvSpPr>
+          <p:cNvPr id="3" name="Content Placeholder 2">
+            <a:extLst>
+              <a:ext uri="{FF2B5EF4-FFF2-40B4-BE49-F238E27FC236}">
+                <a16:creationId xmlns:a16="http://schemas.microsoft.com/office/drawing/2014/main" id="{BC7AE9F6-EB9E-9246-958A-D77FE475F3AF}"/>
+              </a:ext>
+            </a:extLst>
+          </p:cNvPr>
+          <p:cNvSpPr>
+            <a:spLocks noGrp="1"/>
+          </p:cNvSpPr>
+          <p:nvPr>
+            <p:ph idx="1"/>
+          </p:nvPr>
+        </p:nvSpPr>
+        <p:spPr/>
+        <p:txBody>
+          <a:bodyPr/>
+          <a:lstStyle/>
+          <a:p>
+            <a:r>
+              <a:rPr lang="en-US" dirty="0"/>
+              <a:t>Linkwitz Transform</a:t>
+            </a:r>
+          </a:p>
+          <a:p>
+            <a:r>
+              <a:rPr lang="en-US" dirty="0"/>
+              <a:t>Design tools</a:t>
+            </a:r>
+          </a:p>
+        </p:txBody>
+      </p:sp>
+    </p:spTree>
+    <p:extLst>
+      <p:ext uri="{BB962C8B-B14F-4D97-AF65-F5344CB8AC3E}">
+        <p14:creationId xmlns:p14="http://schemas.microsoft.com/office/powerpoint/2010/main" val="3409635627"/>
+      </p:ext>
+    </p:extLst>
+  </p:cSld>
+  <p:clrMapOvr>
+    <a:masterClrMapping/>
+  </p:clrMapOvr>
+</p:sld>
+</file>
+
+<file path=ppt/slides/slide13.xml><?xml version="1.0" encoding="utf-8"?>
+<p:sld xmlns:a="http://schemas.openxmlformats.org/drawingml/2006/main" xmlns:r="http://schemas.openxmlformats.org/officeDocument/2006/relationships" xmlns:p="http://schemas.openxmlformats.org/presentationml/2006/main">
+  <p:cSld>
+    <p:spTree>
+      <p:nvGrpSpPr>
+        <p:cNvPr id="1" name=""/>
+        <p:cNvGrpSpPr/>
+        <p:nvPr/>
+      </p:nvGrpSpPr>
+      <p:grpSpPr>
+        <a:xfrm>
+          <a:off x="0" y="0"/>
+          <a:ext cx="0" cy="0"/>
+          <a:chOff x="0" y="0"/>
+          <a:chExt cx="0" cy="0"/>
+        </a:xfrm>
+      </p:grpSpPr>
+      <p:sp>
+        <p:nvSpPr>
+          <p:cNvPr id="2" name="Title 1">
+            <a:extLst>
+              <a:ext uri="{FF2B5EF4-FFF2-40B4-BE49-F238E27FC236}">
+                <a16:creationId xmlns:a16="http://schemas.microsoft.com/office/drawing/2014/main" id="{3BC0C561-0A9C-D149-9202-3092720D854D}"/>
+              </a:ext>
+            </a:extLst>
+          </p:cNvPr>
+          <p:cNvSpPr>
+            <a:spLocks noGrp="1"/>
+          </p:cNvSpPr>
+          <p:nvPr>
+            <p:ph type="title"/>
+          </p:nvPr>
+        </p:nvSpPr>
+        <p:spPr/>
+        <p:txBody>
+          <a:bodyPr/>
+          <a:lstStyle/>
+          <a:p>
+            <a:r>
+              <a:rPr lang="en-US" dirty="0"/>
+              <a:t>Results</a:t>
+            </a:r>
+          </a:p>
+        </p:txBody>
+      </p:sp>
+      <p:sp>
+        <p:nvSpPr>
+          <p:cNvPr id="3" name="Content Placeholder 2">
+            <a:extLst>
+              <a:ext uri="{FF2B5EF4-FFF2-40B4-BE49-F238E27FC236}">
+                <a16:creationId xmlns:a16="http://schemas.microsoft.com/office/drawing/2014/main" id="{D465918C-588B-EF4D-B36A-9DF3689400BE}"/>
+              </a:ext>
+            </a:extLst>
+          </p:cNvPr>
+          <p:cNvSpPr>
+            <a:spLocks noGrp="1"/>
+          </p:cNvSpPr>
+          <p:nvPr>
+            <p:ph idx="1"/>
+          </p:nvPr>
+        </p:nvSpPr>
+        <p:spPr/>
+        <p:txBody>
+          <a:bodyPr/>
+          <a:lstStyle/>
+          <a:p>
+            <a:r>
+              <a:rPr lang="en-US" dirty="0"/>
+              <a:t>It works in theory</a:t>
+            </a:r>
+          </a:p>
+          <a:p>
+            <a:r>
+              <a:rPr lang="en-US" dirty="0"/>
+              <a:t>Describe process to make the box</a:t>
+            </a:r>
+          </a:p>
+        </p:txBody>
+      </p:sp>
+    </p:spTree>
+    <p:extLst>
+      <p:ext uri="{BB962C8B-B14F-4D97-AF65-F5344CB8AC3E}">
+        <p14:creationId xmlns:p14="http://schemas.microsoft.com/office/powerpoint/2010/main" val="663071535"/>
+      </p:ext>
+    </p:extLst>
+  </p:cSld>
+  <p:clrMapOvr>
+    <a:masterClrMapping/>
+  </p:clrMapOvr>
+</p:sld>
+</file>
+
+<file path=ppt/slides/slide14.xml><?xml version="1.0" encoding="utf-8"?>
+<p:sld xmlns:a="http://schemas.openxmlformats.org/drawingml/2006/main" xmlns:r="http://schemas.openxmlformats.org/officeDocument/2006/relationships" xmlns:p="http://schemas.openxmlformats.org/presentationml/2006/main">
+  <p:cSld>
+    <p:spTree>
+      <p:nvGrpSpPr>
+        <p:cNvPr id="1" name=""/>
+        <p:cNvGrpSpPr/>
+        <p:nvPr/>
+      </p:nvGrpSpPr>
+      <p:grpSpPr>
+        <a:xfrm>
+          <a:off x="0" y="0"/>
+          <a:ext cx="0" cy="0"/>
+          <a:chOff x="0" y="0"/>
+          <a:chExt cx="0" cy="0"/>
+        </a:xfrm>
+      </p:grpSpPr>
+      <p:sp>
+        <p:nvSpPr>
+          <p:cNvPr id="2" name="Title 1">
+            <a:extLst>
+              <a:ext uri="{FF2B5EF4-FFF2-40B4-BE49-F238E27FC236}">
+                <a16:creationId xmlns:a16="http://schemas.microsoft.com/office/drawing/2014/main" id="{30D11954-8BAE-0D40-9CC0-3D1426B35C0A}"/>
+              </a:ext>
+            </a:extLst>
+          </p:cNvPr>
+          <p:cNvSpPr>
+            <a:spLocks noGrp="1"/>
+          </p:cNvSpPr>
+          <p:nvPr>
+            <p:ph type="title"/>
+          </p:nvPr>
+        </p:nvSpPr>
+        <p:spPr/>
+        <p:txBody>
+          <a:bodyPr/>
+          <a:lstStyle/>
+          <a:p>
+            <a:r>
+              <a:rPr lang="en-US" dirty="0"/>
+              <a:t>Plans</a:t>
+            </a:r>
+          </a:p>
+        </p:txBody>
+      </p:sp>
+      <p:sp>
+        <p:nvSpPr>
+          <p:cNvPr id="3" name="Content Placeholder 2">
+            <a:extLst>
+              <a:ext uri="{FF2B5EF4-FFF2-40B4-BE49-F238E27FC236}">
+                <a16:creationId xmlns:a16="http://schemas.microsoft.com/office/drawing/2014/main" id="{9814AEE1-CEF1-BA4F-87C0-660584B9DE3D}"/>
+              </a:ext>
+            </a:extLst>
+          </p:cNvPr>
+          <p:cNvSpPr>
+            <a:spLocks noGrp="1"/>
+          </p:cNvSpPr>
+          <p:nvPr>
+            <p:ph idx="1"/>
+          </p:nvPr>
+        </p:nvSpPr>
+        <p:spPr/>
+        <p:txBody>
+          <a:bodyPr/>
+          <a:lstStyle/>
+          <a:p>
+            <a:r>
+              <a:rPr lang="en-US" dirty="0"/>
+              <a:t>Make and test open-loop compensator</a:t>
+            </a:r>
+          </a:p>
+          <a:p>
+            <a:r>
+              <a:rPr lang="en-US" dirty="0"/>
+              <a:t>Design, simulate, build closed-loop </a:t>
+            </a:r>
+            <a:r>
+              <a:rPr lang="en-US" dirty="0" err="1"/>
+              <a:t>comepsators</a:t>
+            </a:r>
+            <a:endParaRPr lang="en-US" dirty="0"/>
+          </a:p>
+        </p:txBody>
+      </p:sp>
+    </p:spTree>
+    <p:extLst>
+      <p:ext uri="{BB962C8B-B14F-4D97-AF65-F5344CB8AC3E}">
+        <p14:creationId xmlns:p14="http://schemas.microsoft.com/office/powerpoint/2010/main" val="983899657"/>
       </p:ext>
     </p:extLst>
   </p:cSld>
@@ -4368,7 +4692,7 @@
               <a:rPr lang="en-US" dirty="0">
                 <a:latin typeface="Garamond" panose="02020404030301010803" pitchFamily="18" charset="0"/>
               </a:rPr>
-              <a:t>Background research shows that implementing a control system onto a loudspeaker is actually quite feasible</a:t>
+              <a:t>Background research shows that implementing a control system onto a loudspeaker is quite feasible</a:t>
             </a:r>
           </a:p>
           <a:p>
@@ -4594,6 +4918,11 @@
               <a:latin typeface="Garamond" panose="02020404030301010803" pitchFamily="18" charset="0"/>
             </a:endParaRPr>
           </a:p>
+          <a:p>
+            <a:endParaRPr lang="en-GB" dirty="0">
+              <a:latin typeface="Garamond" panose="02020404030301010803" pitchFamily="18" charset="0"/>
+            </a:endParaRPr>
+          </a:p>
         </p:txBody>
       </p:sp>
     </p:spTree>
@@ -4677,20 +5006,37 @@
           <a:p>
             <a:r>
               <a:rPr lang="en-US" dirty="0"/>
-              <a:t>Non-linear</a:t>
+              <a:t>Not normally controlled – distortions and non-linearities are rife</a:t>
             </a:r>
           </a:p>
           <a:p>
             <a:r>
               <a:rPr lang="en-US" dirty="0"/>
-              <a:t>Not normally controlled</a:t>
+              <a:t>Expensive – manufacturers must spend lots to make enclosures and drivers ‘perfect’, most consumers can’t buy good audio</a:t>
             </a:r>
           </a:p>
           <a:p>
             <a:r>
               <a:rPr lang="en-US" dirty="0"/>
-              <a:t>As a result are expensive – average quality of sound reproduction lower than it could be</a:t>
-            </a:r>
+              <a:t>Background theory shows that:</a:t>
+            </a:r>
+          </a:p>
+          <a:p>
+            <a:pPr lvl="1"/>
+            <a:r>
+              <a:rPr lang="en-US" dirty="0"/>
+              <a:t>Subwoofers have the most non-linearities of all the loudspeakers</a:t>
+            </a:r>
+          </a:p>
+          <a:p>
+            <a:pPr lvl="1"/>
+            <a:r>
+              <a:rPr lang="en-US" dirty="0"/>
+              <a:t>Subwoofers can have their bass response extended ’for free’.</a:t>
+            </a:r>
+          </a:p>
+          <a:p>
+            <a:endParaRPr lang="en-US" dirty="0"/>
           </a:p>
         </p:txBody>
       </p:sp>
@@ -4793,11 +5139,8 @@
           <a:p>
             <a:r>
               <a:rPr lang="en-US" dirty="0"/>
-              <a:t>Unique to subwoofers = extension of bass response </a:t>
-            </a:r>
-          </a:p>
-          <a:p>
-            <a:endParaRPr lang="en-US" dirty="0"/>
+              <a:t>‘Free’ extension of bass response = better sound from the same physical system</a:t>
+            </a:r>
           </a:p>
         </p:txBody>
       </p:sp>

</xml_diff>